<commit_message>
Additional sed commands to handle headings.
Uses some shaky heuristics to parse the XML, since each piece of text
has a bunch of consecutive tags:
  - The <a:buNone> tag indicates no bullet (plain text), so strip all
    consecutive tag so text passes through subsequent rules unchanged.
  - Subbullets (two deep) have the <a:pPr> tag, which sets an attribute
    "lvl" which we use to determine the number of pounds to use.
  - The highest level bullet ("lvl" = 0) can be ommitted, so we turn any
    remaining <a:pPr> into a ## heading.
  - Excpet for the first occurance of <a:pPr>, which we take to mean the
    slide title, getting a # heading.
</commit_message>
<xml_diff>
--- a/testdata/presentation.pptx
+++ b/testdata/presentation.pptx
@@ -119,6 +119,7 @@
 <p1510:revInfo xmlns:a="http://schemas.openxmlformats.org/drawingml/2006/main" xmlns:r="http://schemas.openxmlformats.org/officeDocument/2006/relationships" xmlns:p1510="http://schemas.microsoft.com/office/powerpoint/2015/10/main">
   <p1510:revLst>
     <p1510:client id="{22165369-8DF9-414E-B4A7-5FF77FB5A7F1}" v="204" dt="2020-05-26T00:16:12.511"/>
+    <p1510:client id="{311EDA5A-3BDA-44CA-B138-6C6E8AF006B2}" v="72" dt="2020-05-26T06:26:45.472"/>
   </p1510:revLst>
 </p1510:revInfo>
 </file>
@@ -3233,13 +3234,40 @@
           </a:bodyPr>
           <a:lstStyle/>
           <a:p>
-            <a:r>
-              <a:rPr lang="en-US" dirty="0">
+            <a:pPr marL="0" indent="0">
+              <a:buNone/>
+            </a:pPr>
+            <a:r>
+              <a:rPr lang="en-US">
                 <a:cs typeface="Calibri"/>
               </a:rPr>
-              <a:t>This slide has no title, only one bullet.</a:t>
-            </a:r>
-            <a:endParaRPr lang="en-US" dirty="0"/>
+              <a:t>This slide has no title, only freely formatted text.</a:t>
+            </a:r>
+            <a:endParaRPr lang="en-US" dirty="0">
+              <a:cs typeface="Calibri"/>
+            </a:endParaRPr>
+          </a:p>
+          <a:p>
+            <a:pPr marL="0" indent="0">
+              <a:buNone/>
+            </a:pPr>
+            <a:endParaRPr lang="en-US" dirty="0">
+              <a:cs typeface="Calibri"/>
+            </a:endParaRPr>
+          </a:p>
+          <a:p>
+            <a:pPr marL="0" indent="0">
+              <a:buNone/>
+            </a:pPr>
+            <a:r>
+              <a:rPr lang="en-US">
+                <a:cs typeface="Calibri"/>
+              </a:rPr>
+              <a:t>This text spans over multiple lines, without bullets.</a:t>
+            </a:r>
+            <a:endParaRPr lang="en-US" dirty="0">
+              <a:cs typeface="Calibri"/>
+            </a:endParaRPr>
           </a:p>
         </p:txBody>
       </p:sp>

</xml_diff>